<commit_message>
updated poster (brown title background)
</commit_message>
<xml_diff>
--- a/poster.pptx
+++ b/poster.pptx
@@ -2984,12 +2984,13 @@
         <p:spPr>
           <a:xfrm>
             <a:off x="1" y="0"/>
-            <a:ext cx="6857999" cy="1283749"/>
+            <a:ext cx="6858000" cy="1261074"/>
           </a:xfrm>
-          <a:ln>
-            <a:solidFill>
-              <a:schemeClr val="tx1"/>
-            </a:solidFill>
+          <a:solidFill>
+            <a:srgbClr val="AE6548"/>
+          </a:solidFill>
+          <a:ln w="9525">
+            <a:noFill/>
           </a:ln>
         </p:spPr>
         <p:style>
@@ -3008,76 +3009,115 @@
         </p:style>
         <p:txBody>
           <a:bodyPr>
-            <a:normAutofit/>
+            <a:normAutofit fontScale="92500" lnSpcReduction="10000"/>
           </a:bodyPr>
           <a:lstStyle/>
           <a:p>
             <a:pPr defTabSz="951583"/>
             <a:br>
-              <a:rPr lang="en-US" b="1" dirty="0">
+              <a:rPr lang="en-US" sz="2400" b="1" dirty="0">
                 <a:solidFill>
-                  <a:schemeClr val="tx1"/>
+                  <a:schemeClr val="bg1"/>
                 </a:solidFill>
                 <a:latin typeface="Calibri"/>
                 <a:cs typeface="Arial"/>
               </a:rPr>
             </a:br>
             <a:r>
-              <a:rPr lang="en-US" b="1" u="sng" dirty="0">
+              <a:rPr lang="en-US" sz="2400" b="1" u="sng" dirty="0">
                 <a:solidFill>
-                  <a:schemeClr val="tx1"/>
+                  <a:schemeClr val="bg1"/>
                 </a:solidFill>
+                <a:effectLst>
+                  <a:outerShdw blurRad="38100" dist="38100" dir="2700000" algn="tl">
+                    <a:srgbClr val="000000">
+                      <a:alpha val="43137"/>
+                    </a:srgbClr>
+                  </a:outerShdw>
+                </a:effectLst>
                 <a:cs typeface="Arial"/>
               </a:rPr>
               <a:t>Malaria Prediction Model</a:t>
             </a:r>
-            <a:br>
-              <a:rPr lang="en-US" sz="100" b="1" dirty="0">
+          </a:p>
+          <a:p>
+            <a:pPr defTabSz="951583">
+              <a:spcBef>
+                <a:spcPts val="200"/>
+              </a:spcBef>
+              <a:spcAft>
+                <a:spcPts val="200"/>
+              </a:spcAft>
+            </a:pPr>
+            <a:r>
+              <a:rPr lang="en-US" sz="1400" b="1" dirty="0">
                 <a:solidFill>
-                  <a:schemeClr val="tx1"/>
+                  <a:schemeClr val="bg1"/>
                 </a:solidFill>
-                <a:cs typeface="Arial"/>
-              </a:rPr>
-            </a:br>
-            <a:r>
-              <a:rPr lang="en-US" sz="1100" b="1" dirty="0">
-                <a:solidFill>
-                  <a:schemeClr val="tx1"/>
-                </a:solidFill>
+                <a:effectLst>
+                  <a:outerShdw blurRad="38100" dist="38100" dir="2700000" algn="tl">
+                    <a:srgbClr val="000000">
+                      <a:alpha val="43137"/>
+                    </a:srgbClr>
+                  </a:outerShdw>
+                </a:effectLst>
                 <a:cs typeface="Arial"/>
               </a:rPr>
               <a:t>Almog Jakov, Itay Rafee and Neta Roth</a:t>
             </a:r>
-            <a:br>
-              <a:rPr lang="en-US" sz="1100" b="1" dirty="0">
+          </a:p>
+          <a:p>
+            <a:pPr defTabSz="951583">
+              <a:spcBef>
+                <a:spcPts val="200"/>
+              </a:spcBef>
+              <a:spcAft>
+                <a:spcPts val="200"/>
+              </a:spcAft>
+            </a:pPr>
+            <a:r>
+              <a:rPr lang="en-US" sz="1400" b="1" dirty="0">
                 <a:solidFill>
-                  <a:schemeClr val="tx1"/>
+                  <a:schemeClr val="bg1"/>
                 </a:solidFill>
-                <a:cs typeface="Arial"/>
-              </a:rPr>
-            </a:br>
-            <a:r>
-              <a:rPr lang="en-US" sz="1100" b="1" dirty="0">
-                <a:solidFill>
-                  <a:schemeClr val="tx1"/>
-                </a:solidFill>
+                <a:effectLst>
+                  <a:outerShdw blurRad="38100" dist="38100" dir="2700000" algn="tl">
+                    <a:srgbClr val="000000">
+                      <a:alpha val="43137"/>
+                    </a:srgbClr>
+                  </a:outerShdw>
+                </a:effectLst>
                 <a:cs typeface="Arial"/>
               </a:rPr>
               <a:t>Elizabeth Itzkovich</a:t>
             </a:r>
             <a:br>
-              <a:rPr lang="en-US" sz="1307" b="1" dirty="0">
+              <a:rPr lang="en-US" sz="1600" b="1" dirty="0">
                 <a:solidFill>
-                  <a:srgbClr val="FF0000"/>
+                  <a:schemeClr val="bg1"/>
                 </a:solidFill>
+                <a:effectLst>
+                  <a:outerShdw blurRad="38100" dist="38100" dir="2700000" algn="tl">
+                    <a:srgbClr val="000000">
+                      <a:alpha val="43137"/>
+                    </a:srgbClr>
+                  </a:outerShdw>
+                </a:effectLst>
                 <a:latin typeface="Calibri"/>
                 <a:cs typeface="Arial"/>
               </a:rPr>
             </a:br>
-            <a:endParaRPr lang="he-IL" sz="1307" b="1" dirty="0">
+            <a:endParaRPr lang="he-IL" sz="1600" b="1" dirty="0">
               <a:solidFill>
-                <a:srgbClr val="FF0000"/>
+                <a:schemeClr val="bg1"/>
               </a:solidFill>
+              <a:effectLst>
+                <a:outerShdw blurRad="38100" dist="38100" dir="2700000" algn="tl">
+                  <a:srgbClr val="000000">
+                    <a:alpha val="43137"/>
+                  </a:srgbClr>
+                </a:outerShdw>
+              </a:effectLst>
               <a:latin typeface="Calibri"/>
               <a:cs typeface="Arial"/>
             </a:endParaRPr>
@@ -3570,110 +3610,25 @@
           <a:p>
             <a:pPr algn="ctr"/>
             <a:r>
-              <a:rPr lang="he-IL" sz="2400" dirty="0"/>
-              <a:t>42</a:t>
-            </a:r>
-            <a:endParaRPr lang="en-US" sz="2400" dirty="0"/>
-          </a:p>
-        </p:txBody>
-      </p:sp>
-      <p:sp>
-        <p:nvSpPr>
-          <p:cNvPr id="4" name="Rectangle 1">
-            <a:extLst>
-              <a:ext uri="{FF2B5EF4-FFF2-40B4-BE49-F238E27FC236}">
-                <a16:creationId xmlns:a16="http://schemas.microsoft.com/office/drawing/2014/main" id="{9E8AFAD1-9C8E-AA66-1E90-8E0F2038E740}"/>
-              </a:ext>
-            </a:extLst>
-          </p:cNvPr>
-          <p:cNvSpPr>
-            <a:spLocks noChangeArrowheads="1"/>
-          </p:cNvSpPr>
-          <p:nvPr/>
-        </p:nvSpPr>
-        <p:spPr bwMode="auto">
-          <a:xfrm>
-            <a:off x="0" y="217052"/>
-            <a:ext cx="11222" cy="23095"/>
-          </a:xfrm>
-          <a:prstGeom prst="rect">
-            <a:avLst/>
-          </a:prstGeom>
-          <a:solidFill>
-            <a:srgbClr val="303134"/>
-          </a:solidFill>
-          <a:ln>
-            <a:noFill/>
-          </a:ln>
-          <a:effectLst/>
-          <a:extLst>
-            <a:ext uri="{91240B29-F687-4F45-9708-019B960494DF}">
-              <a14:hiddenLine xmlns:a14="http://schemas.microsoft.com/office/drawing/2010/main" w="9525">
-                <a:solidFill>
-                  <a:schemeClr val="tx1"/>
-                </a:solidFill>
-                <a:miter lim="800000"/>
-                <a:headEnd/>
-                <a:tailEnd/>
-              </a14:hiddenLine>
-            </a:ext>
-            <a:ext uri="{AF507438-7753-43E0-B8FC-AC1667EBCBE1}">
-              <a14:hiddenEffects xmlns:a14="http://schemas.microsoft.com/office/drawing/2010/main">
+              <a:rPr lang="he-IL" sz="2400" dirty="0">
                 <a:effectLst>
-                  <a:outerShdw dist="35921" dir="2700000" algn="ctr" rotWithShape="0">
-                    <a:schemeClr val="bg2"/>
+                  <a:outerShdw blurRad="38100" dist="38100" dir="2700000" algn="tl">
+                    <a:srgbClr val="000000">
+                      <a:alpha val="43137"/>
+                    </a:srgbClr>
                   </a:outerShdw>
                 </a:effectLst>
-              </a14:hiddenEffects>
-            </a:ext>
-          </a:extLst>
-        </p:spPr>
-        <p:txBody>
-          <a:bodyPr vert="horz" wrap="none" lIns="0" tIns="-19044" rIns="0" bIns="-19044" numCol="1" anchor="ctr" anchorCtr="0" compatLnSpc="1">
-            <a:prstTxWarp prst="textNoShape">
-              <a:avLst/>
-            </a:prstTxWarp>
-            <a:spAutoFit/>
-          </a:bodyPr>
-          <a:lstStyle/>
-          <a:p>
-            <a:pPr marL="0" marR="0" lvl="0" indent="0" algn="l" defTabSz="914400" rtl="0" eaLnBrk="0" fontAlgn="base" latinLnBrk="0" hangingPunct="0">
-              <a:lnSpc>
-                <a:spcPct val="100000"/>
-              </a:lnSpc>
-              <a:spcBef>
-                <a:spcPct val="0"/>
-              </a:spcBef>
-              <a:spcAft>
-                <a:spcPct val="0"/>
-              </a:spcAft>
-              <a:buClrTx/>
-              <a:buSzTx/>
-              <a:buFontTx/>
-              <a:buNone/>
-              <a:tabLst/>
-            </a:pPr>
-            <a:r>
-              <a:rPr kumimoji="0" lang="LID4096" altLang="LID4096" sz="400" b="0" i="0" u="none" strike="noStrike" cap="none" normalizeH="0" baseline="0" dirty="0">
-                <a:ln>
-                  <a:noFill/>
-                </a:ln>
-                <a:solidFill>
-                  <a:schemeClr val="tx1"/>
-                </a:solidFill>
-                <a:effectLst/>
               </a:rPr>
-              <a:t> </a:t>
-            </a:r>
-            <a:endParaRPr kumimoji="0" lang="LID4096" altLang="LID4096" sz="1800" b="0" i="0" u="none" strike="noStrike" cap="none" normalizeH="0" baseline="0" dirty="0">
-              <a:ln>
-                <a:noFill/>
-              </a:ln>
-              <a:solidFill>
-                <a:schemeClr val="tx1"/>
-              </a:solidFill>
-              <a:effectLst/>
-              <a:latin typeface="Arial" panose="020B0604020202020204" pitchFamily="34" charset="0"/>
+              <a:t>42</a:t>
+            </a:r>
+            <a:endParaRPr lang="en-US" sz="2400" dirty="0">
+              <a:effectLst>
+                <a:outerShdw blurRad="38100" dist="38100" dir="2700000" algn="tl">
+                  <a:srgbClr val="000000">
+                    <a:alpha val="43137"/>
+                  </a:srgbClr>
+                </a:outerShdw>
+              </a:effectLst>
             </a:endParaRPr>
           </a:p>
         </p:txBody>
@@ -4859,45 +4814,6 @@
       </p:sp>
       <p:pic>
         <p:nvPicPr>
-          <p:cNvPr id="11" name="תמונה 10">
-            <a:extLst>
-              <a:ext uri="{FF2B5EF4-FFF2-40B4-BE49-F238E27FC236}">
-                <a16:creationId xmlns:a16="http://schemas.microsoft.com/office/drawing/2014/main" id="{9EFAE8E0-3100-46D0-BEED-5162214438B6}"/>
-              </a:ext>
-            </a:extLst>
-          </p:cNvPr>
-          <p:cNvPicPr>
-            <a:picLocks noChangeAspect="1"/>
-          </p:cNvPicPr>
-          <p:nvPr/>
-        </p:nvPicPr>
-        <p:blipFill>
-          <a:blip r:embed="rId4">
-            <a:extLst>
-              <a:ext uri="{28A0092B-C50C-407E-A947-70E740481C1C}">
-                <a14:useLocalDpi xmlns:a14="http://schemas.microsoft.com/office/drawing/2010/main" val="0"/>
-              </a:ext>
-            </a:extLst>
-          </a:blip>
-          <a:stretch>
-            <a:fillRect/>
-          </a:stretch>
-        </p:blipFill>
-        <p:spPr>
-          <a:xfrm>
-            <a:off x="239819" y="286348"/>
-            <a:ext cx="839681" cy="839681"/>
-          </a:xfrm>
-          <a:prstGeom prst="rect">
-            <a:avLst/>
-          </a:prstGeom>
-          <a:ln w="12700">
-            <a:noFill/>
-          </a:ln>
-        </p:spPr>
-      </p:pic>
-      <p:pic>
-        <p:nvPicPr>
           <p:cNvPr id="9" name="תמונה 8">
             <a:extLst>
               <a:ext uri="{FF2B5EF4-FFF2-40B4-BE49-F238E27FC236}">
@@ -4911,7 +4827,7 @@
           <p:nvPr/>
         </p:nvPicPr>
         <p:blipFill>
-          <a:blip r:embed="rId5">
+          <a:blip r:embed="rId4">
             <a:extLst>
               <a:ext uri="{28A0092B-C50C-407E-A947-70E740481C1C}">
                 <a14:useLocalDpi xmlns:a14="http://schemas.microsoft.com/office/drawing/2010/main" val="0"/>
@@ -4947,7 +4863,7 @@
           <p:nvPr/>
         </p:nvPicPr>
         <p:blipFill>
-          <a:blip r:embed="rId6">
+          <a:blip r:embed="rId5">
             <a:extLst>
               <a:ext uri="{28A0092B-C50C-407E-A947-70E740481C1C}">
                 <a14:useLocalDpi xmlns:a14="http://schemas.microsoft.com/office/drawing/2010/main" val="0"/>
@@ -4983,7 +4899,7 @@
           <p:nvPr/>
         </p:nvPicPr>
         <p:blipFill>
-          <a:blip r:embed="rId7">
+          <a:blip r:embed="rId6">
             <a:extLst>
               <a:ext uri="{28A0092B-C50C-407E-A947-70E740481C1C}">
                 <a14:useLocalDpi xmlns:a14="http://schemas.microsoft.com/office/drawing/2010/main" val="0"/>
@@ -5024,11 +4940,11 @@
           <p:nvPr/>
         </p:nvPicPr>
         <p:blipFill>
-          <a:blip r:embed="rId8">
+          <a:blip r:embed="rId7">
             <a:extLst>
               <a:ext uri="{BEBA8EAE-BF5A-486C-A8C5-ECC9F3942E4B}">
                 <a14:imgProps xmlns:a14="http://schemas.microsoft.com/office/drawing/2010/main">
-                  <a14:imgLayer r:embed="rId9">
+                  <a14:imgLayer r:embed="rId8">
                     <a14:imgEffect>
                       <a14:saturation sat="85000"/>
                     </a14:imgEffect>
@@ -5115,7 +5031,7 @@
           <p:nvPr/>
         </p:nvPicPr>
         <p:blipFill>
-          <a:blip r:embed="rId10">
+          <a:blip r:embed="rId9">
             <a:extLst>
               <a:ext uri="{28A0092B-C50C-407E-A947-70E740481C1C}">
                 <a14:useLocalDpi xmlns:a14="http://schemas.microsoft.com/office/drawing/2010/main" val="0"/>
@@ -5130,6 +5046,54 @@
           <a:xfrm>
             <a:off x="819325" y="8450825"/>
             <a:ext cx="1866709" cy="1329672"/>
+          </a:xfrm>
+          <a:prstGeom prst="rect">
+            <a:avLst/>
+          </a:prstGeom>
+        </p:spPr>
+      </p:pic>
+      <p:pic>
+        <p:nvPicPr>
+          <p:cNvPr id="6" name="תמונה 5">
+            <a:extLst>
+              <a:ext uri="{FF2B5EF4-FFF2-40B4-BE49-F238E27FC236}">
+                <a16:creationId xmlns:a16="http://schemas.microsoft.com/office/drawing/2014/main" id="{75A6D906-E040-42C9-B805-5737C7A70C6E}"/>
+              </a:ext>
+            </a:extLst>
+          </p:cNvPr>
+          <p:cNvPicPr>
+            <a:picLocks noChangeAspect="1"/>
+          </p:cNvPicPr>
+          <p:nvPr/>
+        </p:nvPicPr>
+        <p:blipFill>
+          <a:blip r:embed="rId10">
+            <a:extLst>
+              <a:ext uri="{BEBA8EAE-BF5A-486C-A8C5-ECC9F3942E4B}">
+                <a14:imgProps xmlns:a14="http://schemas.microsoft.com/office/drawing/2010/main">
+                  <a14:imgLayer r:embed="rId11">
+                    <a14:imgEffect>
+                      <a14:sharpenSoften amount="27000"/>
+                    </a14:imgEffect>
+                    <a14:imgEffect>
+                      <a14:brightnessContrast contrast="30000"/>
+                    </a14:imgEffect>
+                  </a14:imgLayer>
+                </a14:imgProps>
+              </a:ext>
+              <a:ext uri="{28A0092B-C50C-407E-A947-70E740481C1C}">
+                <a14:useLocalDpi xmlns:a14="http://schemas.microsoft.com/office/drawing/2010/main" val="0"/>
+              </a:ext>
+            </a:extLst>
+          </a:blip>
+          <a:stretch>
+            <a:fillRect/>
+          </a:stretch>
+        </p:blipFill>
+        <p:spPr>
+          <a:xfrm>
+            <a:off x="239819" y="290269"/>
+            <a:ext cx="839681" cy="839681"/>
           </a:xfrm>
           <a:prstGeom prst="rect">
             <a:avLst/>

</xml_diff>